<commit_message>
Started to re-write the DS3231 library
</commit_message>
<xml_diff>
--- a/Wiring diagram.pptx
+++ b/Wiring diagram.pptx
@@ -104,6 +104,11 @@
       </a:defRPr>
     </a:lvl9pPr>
   </p:defaultTextStyle>
+  <p:extLst>
+    <p:ext uri="{EFAFB233-063F-42B5-8137-9DF3F51BA10A}">
+      <p15:sldGuideLst xmlns:p15="http://schemas.microsoft.com/office/powerpoint/2012/main"/>
+    </p:ext>
+  </p:extLst>
 </p:presentation>
 </file>
 
@@ -256,7 +261,7 @@
           <a:p>
             <a:fld id="{3FF8DEA7-ACAB-4046-AEC2-2D128801CE29}" type="datetimeFigureOut">
               <a:rPr lang="en-GB" smtClean="0"/>
-              <a:t>25 Jul 20</a:t>
+              <a:t>26 Jul 20</a:t>
             </a:fld>
             <a:endParaRPr lang="en-GB"/>
           </a:p>
@@ -456,7 +461,7 @@
           <a:p>
             <a:fld id="{3FF8DEA7-ACAB-4046-AEC2-2D128801CE29}" type="datetimeFigureOut">
               <a:rPr lang="en-GB" smtClean="0"/>
-              <a:t>25 Jul 20</a:t>
+              <a:t>26 Jul 20</a:t>
             </a:fld>
             <a:endParaRPr lang="en-GB"/>
           </a:p>
@@ -666,7 +671,7 @@
           <a:p>
             <a:fld id="{3FF8DEA7-ACAB-4046-AEC2-2D128801CE29}" type="datetimeFigureOut">
               <a:rPr lang="en-GB" smtClean="0"/>
-              <a:t>25 Jul 20</a:t>
+              <a:t>26 Jul 20</a:t>
             </a:fld>
             <a:endParaRPr lang="en-GB"/>
           </a:p>
@@ -866,7 +871,7 @@
           <a:p>
             <a:fld id="{3FF8DEA7-ACAB-4046-AEC2-2D128801CE29}" type="datetimeFigureOut">
               <a:rPr lang="en-GB" smtClean="0"/>
-              <a:t>25 Jul 20</a:t>
+              <a:t>26 Jul 20</a:t>
             </a:fld>
             <a:endParaRPr lang="en-GB"/>
           </a:p>
@@ -1142,7 +1147,7 @@
           <a:p>
             <a:fld id="{3FF8DEA7-ACAB-4046-AEC2-2D128801CE29}" type="datetimeFigureOut">
               <a:rPr lang="en-GB" smtClean="0"/>
-              <a:t>25 Jul 20</a:t>
+              <a:t>26 Jul 20</a:t>
             </a:fld>
             <a:endParaRPr lang="en-GB"/>
           </a:p>
@@ -1410,7 +1415,7 @@
           <a:p>
             <a:fld id="{3FF8DEA7-ACAB-4046-AEC2-2D128801CE29}" type="datetimeFigureOut">
               <a:rPr lang="en-GB" smtClean="0"/>
-              <a:t>25 Jul 20</a:t>
+              <a:t>26 Jul 20</a:t>
             </a:fld>
             <a:endParaRPr lang="en-GB"/>
           </a:p>
@@ -1825,7 +1830,7 @@
           <a:p>
             <a:fld id="{3FF8DEA7-ACAB-4046-AEC2-2D128801CE29}" type="datetimeFigureOut">
               <a:rPr lang="en-GB" smtClean="0"/>
-              <a:t>25 Jul 20</a:t>
+              <a:t>26 Jul 20</a:t>
             </a:fld>
             <a:endParaRPr lang="en-GB"/>
           </a:p>
@@ -1967,7 +1972,7 @@
           <a:p>
             <a:fld id="{3FF8DEA7-ACAB-4046-AEC2-2D128801CE29}" type="datetimeFigureOut">
               <a:rPr lang="en-GB" smtClean="0"/>
-              <a:t>25 Jul 20</a:t>
+              <a:t>26 Jul 20</a:t>
             </a:fld>
             <a:endParaRPr lang="en-GB"/>
           </a:p>
@@ -2080,7 +2085,7 @@
           <a:p>
             <a:fld id="{3FF8DEA7-ACAB-4046-AEC2-2D128801CE29}" type="datetimeFigureOut">
               <a:rPr lang="en-GB" smtClean="0"/>
-              <a:t>25 Jul 20</a:t>
+              <a:t>26 Jul 20</a:t>
             </a:fld>
             <a:endParaRPr lang="en-GB"/>
           </a:p>
@@ -2393,7 +2398,7 @@
           <a:p>
             <a:fld id="{3FF8DEA7-ACAB-4046-AEC2-2D128801CE29}" type="datetimeFigureOut">
               <a:rPr lang="en-GB" smtClean="0"/>
-              <a:t>25 Jul 20</a:t>
+              <a:t>26 Jul 20</a:t>
             </a:fld>
             <a:endParaRPr lang="en-GB"/>
           </a:p>
@@ -2682,7 +2687,7 @@
           <a:p>
             <a:fld id="{3FF8DEA7-ACAB-4046-AEC2-2D128801CE29}" type="datetimeFigureOut">
               <a:rPr lang="en-GB" smtClean="0"/>
-              <a:t>25 Jul 20</a:t>
+              <a:t>26 Jul 20</a:t>
             </a:fld>
             <a:endParaRPr lang="en-GB"/>
           </a:p>
@@ -2925,7 +2930,7 @@
           <a:p>
             <a:fld id="{3FF8DEA7-ACAB-4046-AEC2-2D128801CE29}" type="datetimeFigureOut">
               <a:rPr lang="en-GB" smtClean="0"/>
-              <a:t>25 Jul 20</a:t>
+              <a:t>26 Jul 20</a:t>
             </a:fld>
             <a:endParaRPr lang="en-GB"/>
           </a:p>
@@ -3448,54 +3453,9 @@
           <a:stretch/>
         </p:blipFill>
         <p:spPr bwMode="auto">
-          <a:xfrm>
+          <a:xfrm rot="10800000">
             <a:off x="316249" y="2791353"/>
             <a:ext cx="2471328" cy="1421134"/>
-          </a:xfrm>
-          <a:prstGeom prst="rect">
-            <a:avLst/>
-          </a:prstGeom>
-          <a:noFill/>
-          <a:extLst>
-            <a:ext uri="{909E8E84-426E-40DD-AFC4-6F175D3DCCD1}">
-              <a14:hiddenFill xmlns:a14="http://schemas.microsoft.com/office/drawing/2010/main">
-                <a:solidFill>
-                  <a:srgbClr val="FFFFFF"/>
-                </a:solidFill>
-              </a14:hiddenFill>
-            </a:ext>
-          </a:extLst>
-        </p:spPr>
-      </p:pic>
-      <p:pic>
-        <p:nvPicPr>
-          <p:cNvPr id="1030" name="Picture 6">
-            <a:extLst>
-              <a:ext uri="{FF2B5EF4-FFF2-40B4-BE49-F238E27FC236}">
-                <a16:creationId xmlns:a16="http://schemas.microsoft.com/office/drawing/2014/main" id="{BC0F8500-4DDB-4C14-9555-CAABB45A45ED}"/>
-              </a:ext>
-            </a:extLst>
-          </p:cNvPr>
-          <p:cNvPicPr>
-            <a:picLocks noChangeAspect="1" noChangeArrowheads="1"/>
-          </p:cNvPicPr>
-          <p:nvPr/>
-        </p:nvPicPr>
-        <p:blipFill>
-          <a:blip r:embed="rId5">
-            <a:extLst>
-              <a:ext uri="{28A0092B-C50C-407E-A947-70E740481C1C}">
-                <a14:useLocalDpi xmlns:a14="http://schemas.microsoft.com/office/drawing/2010/main" val="0"/>
-              </a:ext>
-            </a:extLst>
-          </a:blip>
-          <a:srcRect/>
-          <a:stretch/>
-        </p:blipFill>
-        <p:spPr bwMode="auto">
-          <a:xfrm>
-            <a:off x="1587149" y="3474454"/>
-            <a:ext cx="5614882" cy="3356498"/>
           </a:xfrm>
           <a:prstGeom prst="rect">
             <a:avLst/>
@@ -4096,8 +4056,8 @@
         </p:nvSpPr>
         <p:spPr>
           <a:xfrm>
-            <a:off x="2676525" y="3743325"/>
-            <a:ext cx="904875" cy="180975"/>
+            <a:off x="2676525" y="3079751"/>
+            <a:ext cx="904875" cy="2415702"/>
           </a:xfrm>
           <a:custGeom>
             <a:avLst/>
@@ -4110,6 +4070,30 @@
               <a:gd name="connsiteY2" fmla="*/ 180975 h 180975"/>
               <a:gd name="connsiteX3" fmla="*/ 904875 w 904875"/>
               <a:gd name="connsiteY3" fmla="*/ 180975 h 180975"/>
+              <a:gd name="connsiteX0" fmla="*/ 0 w 904875"/>
+              <a:gd name="connsiteY0" fmla="*/ 0 h 180975"/>
+              <a:gd name="connsiteX1" fmla="*/ 676275 w 904875"/>
+              <a:gd name="connsiteY1" fmla="*/ 0 h 180975"/>
+              <a:gd name="connsiteX2" fmla="*/ 561975 w 904875"/>
+              <a:gd name="connsiteY2" fmla="*/ 180975 h 180975"/>
+              <a:gd name="connsiteX3" fmla="*/ 904875 w 904875"/>
+              <a:gd name="connsiteY3" fmla="*/ 180975 h 180975"/>
+              <a:gd name="connsiteX0" fmla="*/ 0 w 904875"/>
+              <a:gd name="connsiteY0" fmla="*/ 0 h 180975"/>
+              <a:gd name="connsiteX1" fmla="*/ 676275 w 904875"/>
+              <a:gd name="connsiteY1" fmla="*/ 0 h 180975"/>
+              <a:gd name="connsiteX2" fmla="*/ 659606 w 904875"/>
+              <a:gd name="connsiteY2" fmla="*/ 180975 h 180975"/>
+              <a:gd name="connsiteX3" fmla="*/ 904875 w 904875"/>
+              <a:gd name="connsiteY3" fmla="*/ 180975 h 180975"/>
+              <a:gd name="connsiteX0" fmla="*/ 0 w 904875"/>
+              <a:gd name="connsiteY0" fmla="*/ 0 h 180975"/>
+              <a:gd name="connsiteX1" fmla="*/ 676275 w 904875"/>
+              <a:gd name="connsiteY1" fmla="*/ 0 h 180975"/>
+              <a:gd name="connsiteX2" fmla="*/ 671513 w 904875"/>
+              <a:gd name="connsiteY2" fmla="*/ 180975 h 180975"/>
+              <a:gd name="connsiteX3" fmla="*/ 904875 w 904875"/>
+              <a:gd name="connsiteY3" fmla="*/ 180975 h 180975"/>
             </a:gdLst>
             <a:ahLst/>
             <a:cxnLst>
@@ -4133,10 +4117,10 @@
                   <a:pt x="0" y="0"/>
                 </a:moveTo>
                 <a:lnTo>
-                  <a:pt x="561975" y="0"/>
+                  <a:pt x="676275" y="0"/>
                 </a:lnTo>
                 <a:lnTo>
-                  <a:pt x="561975" y="180975"/>
+                  <a:pt x="671513" y="180975"/>
                 </a:lnTo>
                 <a:lnTo>
                   <a:pt x="904875" y="180975"/>
@@ -4178,10 +4162,10 @@
       </p:sp>
       <p:sp>
         <p:nvSpPr>
-          <p:cNvPr id="13" name="Freeform: Shape 12">
-            <a:extLst>
-              <a:ext uri="{FF2B5EF4-FFF2-40B4-BE49-F238E27FC236}">
-                <a16:creationId xmlns:a16="http://schemas.microsoft.com/office/drawing/2014/main" id="{20628F29-1201-4179-927E-F7C6080FC621}"/>
+          <p:cNvPr id="14" name="Freeform: Shape 13">
+            <a:extLst>
+              <a:ext uri="{FF2B5EF4-FFF2-40B4-BE49-F238E27FC236}">
+                <a16:creationId xmlns:a16="http://schemas.microsoft.com/office/drawing/2014/main" id="{A63CD1E3-206E-4CD2-AC95-41D89B49C98B}"/>
               </a:ext>
             </a:extLst>
           </p:cNvPr>
@@ -4190,105 +4174,8 @@
         </p:nvSpPr>
         <p:spPr>
           <a:xfrm>
-            <a:off x="2679700" y="3416300"/>
-            <a:ext cx="463550" cy="844550"/>
-          </a:xfrm>
-          <a:custGeom>
-            <a:avLst/>
-            <a:gdLst>
-              <a:gd name="connsiteX0" fmla="*/ 0 w 463550"/>
-              <a:gd name="connsiteY0" fmla="*/ 0 h 844550"/>
-              <a:gd name="connsiteX1" fmla="*/ 200025 w 463550"/>
-              <a:gd name="connsiteY1" fmla="*/ 0 h 844550"/>
-              <a:gd name="connsiteX2" fmla="*/ 200025 w 463550"/>
-              <a:gd name="connsiteY2" fmla="*/ 844550 h 844550"/>
-              <a:gd name="connsiteX3" fmla="*/ 463550 w 463550"/>
-              <a:gd name="connsiteY3" fmla="*/ 844550 h 844550"/>
-            </a:gdLst>
-            <a:ahLst/>
-            <a:cxnLst>
-              <a:cxn ang="0">
-                <a:pos x="connsiteX0" y="connsiteY0"/>
-              </a:cxn>
-              <a:cxn ang="0">
-                <a:pos x="connsiteX1" y="connsiteY1"/>
-              </a:cxn>
-              <a:cxn ang="0">
-                <a:pos x="connsiteX2" y="connsiteY2"/>
-              </a:cxn>
-              <a:cxn ang="0">
-                <a:pos x="connsiteX3" y="connsiteY3"/>
-              </a:cxn>
-            </a:cxnLst>
-            <a:rect l="l" t="t" r="r" b="b"/>
-            <a:pathLst>
-              <a:path w="463550" h="844550">
-                <a:moveTo>
-                  <a:pt x="0" y="0"/>
-                </a:moveTo>
-                <a:lnTo>
-                  <a:pt x="200025" y="0"/>
-                </a:lnTo>
-                <a:lnTo>
-                  <a:pt x="200025" y="844550"/>
-                </a:lnTo>
-                <a:lnTo>
-                  <a:pt x="463550" y="844550"/>
-                </a:lnTo>
-              </a:path>
-            </a:pathLst>
-          </a:custGeom>
-          <a:noFill/>
-          <a:ln>
-            <a:solidFill>
-              <a:schemeClr val="accent1">
-                <a:lumMod val="60000"/>
-                <a:lumOff val="40000"/>
-              </a:schemeClr>
-            </a:solidFill>
-          </a:ln>
-        </p:spPr>
-        <p:style>
-          <a:lnRef idx="2">
-            <a:schemeClr val="accent1">
-              <a:shade val="50000"/>
-            </a:schemeClr>
-          </a:lnRef>
-          <a:fillRef idx="1">
-            <a:schemeClr val="accent1"/>
-          </a:fillRef>
-          <a:effectRef idx="0">
-            <a:schemeClr val="accent1"/>
-          </a:effectRef>
-          <a:fontRef idx="minor">
-            <a:schemeClr val="lt1"/>
-          </a:fontRef>
-        </p:style>
-        <p:txBody>
-          <a:bodyPr rtlCol="0" anchor="ctr"/>
-          <a:lstStyle/>
-          <a:p>
-            <a:pPr algn="ctr"/>
-            <a:endParaRPr lang="en-GB"/>
-          </a:p>
-        </p:txBody>
-      </p:sp>
-      <p:sp>
-        <p:nvSpPr>
-          <p:cNvPr id="14" name="Freeform: Shape 13">
-            <a:extLst>
-              <a:ext uri="{FF2B5EF4-FFF2-40B4-BE49-F238E27FC236}">
-                <a16:creationId xmlns:a16="http://schemas.microsoft.com/office/drawing/2014/main" id="{A63CD1E3-206E-4CD2-AC95-41D89B49C98B}"/>
-              </a:ext>
-            </a:extLst>
-          </p:cNvPr>
-          <p:cNvSpPr/>
-          <p:nvPr/>
-        </p:nvSpPr>
-        <p:spPr>
-          <a:xfrm>
-            <a:off x="2682875" y="3251200"/>
-            <a:ext cx="466725" cy="1165225"/>
+            <a:off x="2682875" y="3565748"/>
+            <a:ext cx="466725" cy="850677"/>
           </a:xfrm>
           <a:custGeom>
             <a:avLst/>
@@ -4384,8 +4271,8 @@
         </p:nvSpPr>
         <p:spPr>
           <a:xfrm>
-            <a:off x="2679700" y="3587750"/>
-            <a:ext cx="895350" cy="2082800"/>
+            <a:off x="2679700" y="3235325"/>
+            <a:ext cx="895350" cy="2435225"/>
           </a:xfrm>
           <a:custGeom>
             <a:avLst/>
@@ -4398,6 +4285,22 @@
               <a:gd name="connsiteY2" fmla="*/ 2082800 h 2082800"/>
               <a:gd name="connsiteX3" fmla="*/ 895350 w 895350"/>
               <a:gd name="connsiteY3" fmla="*/ 2082800 h 2082800"/>
+              <a:gd name="connsiteX0" fmla="*/ 0 w 895350"/>
+              <a:gd name="connsiteY0" fmla="*/ 0 h 2082800"/>
+              <a:gd name="connsiteX1" fmla="*/ 560388 w 895350"/>
+              <a:gd name="connsiteY1" fmla="*/ 0 h 2082800"/>
+              <a:gd name="connsiteX2" fmla="*/ 717550 w 895350"/>
+              <a:gd name="connsiteY2" fmla="*/ 2082800 h 2082800"/>
+              <a:gd name="connsiteX3" fmla="*/ 895350 w 895350"/>
+              <a:gd name="connsiteY3" fmla="*/ 2082800 h 2082800"/>
+              <a:gd name="connsiteX0" fmla="*/ 0 w 895350"/>
+              <a:gd name="connsiteY0" fmla="*/ 0 h 2082800"/>
+              <a:gd name="connsiteX1" fmla="*/ 560388 w 895350"/>
+              <a:gd name="connsiteY1" fmla="*/ 0 h 2082800"/>
+              <a:gd name="connsiteX2" fmla="*/ 550862 w 895350"/>
+              <a:gd name="connsiteY2" fmla="*/ 2082800 h 2082800"/>
+              <a:gd name="connsiteX3" fmla="*/ 895350 w 895350"/>
+              <a:gd name="connsiteY3" fmla="*/ 2082800 h 2082800"/>
             </a:gdLst>
             <a:ahLst/>
             <a:cxnLst>
@@ -4421,11 +4324,13 @@
                   <a:pt x="0" y="0"/>
                 </a:moveTo>
                 <a:lnTo>
-                  <a:pt x="717550" y="0"/>
+                  <a:pt x="560388" y="0"/>
                 </a:lnTo>
-                <a:lnTo>
-                  <a:pt x="717550" y="2082800"/>
-                </a:lnTo>
+                <a:cubicBezTo>
+                  <a:pt x="557213" y="694267"/>
+                  <a:pt x="554037" y="1388533"/>
+                  <a:pt x="550862" y="2082800"/>
+                </a:cubicBezTo>
                 <a:lnTo>
                   <a:pt x="895350" y="2082800"/>
                 </a:lnTo>
@@ -4950,6 +4855,389 @@
             <a:r>
               <a:rPr lang="en-GB" dirty="0"/>
               <a:t>Motor</a:t>
+            </a:r>
+          </a:p>
+        </p:txBody>
+      </p:sp>
+      <p:sp>
+        <p:nvSpPr>
+          <p:cNvPr id="2" name="Freeform: Shape 1">
+            <a:extLst>
+              <a:ext uri="{FF2B5EF4-FFF2-40B4-BE49-F238E27FC236}">
+                <a16:creationId xmlns:a16="http://schemas.microsoft.com/office/drawing/2014/main" id="{C71B5BA8-8666-4AAF-8ED9-2F41DC9DA24F}"/>
+              </a:ext>
+            </a:extLst>
+          </p:cNvPr>
+          <p:cNvSpPr/>
+          <p:nvPr/>
+        </p:nvSpPr>
+        <p:spPr>
+          <a:xfrm>
+            <a:off x="2670175" y="3403600"/>
+            <a:ext cx="485775" cy="854075"/>
+          </a:xfrm>
+          <a:custGeom>
+            <a:avLst/>
+            <a:gdLst>
+              <a:gd name="connsiteX0" fmla="*/ 0 w 485775"/>
+              <a:gd name="connsiteY0" fmla="*/ 0 h 854075"/>
+              <a:gd name="connsiteX1" fmla="*/ 409575 w 485775"/>
+              <a:gd name="connsiteY1" fmla="*/ 0 h 854075"/>
+              <a:gd name="connsiteX2" fmla="*/ 409575 w 485775"/>
+              <a:gd name="connsiteY2" fmla="*/ 854075 h 854075"/>
+              <a:gd name="connsiteX3" fmla="*/ 485775 w 485775"/>
+              <a:gd name="connsiteY3" fmla="*/ 854075 h 854075"/>
+            </a:gdLst>
+            <a:ahLst/>
+            <a:cxnLst>
+              <a:cxn ang="0">
+                <a:pos x="connsiteX0" y="connsiteY0"/>
+              </a:cxn>
+              <a:cxn ang="0">
+                <a:pos x="connsiteX1" y="connsiteY1"/>
+              </a:cxn>
+              <a:cxn ang="0">
+                <a:pos x="connsiteX2" y="connsiteY2"/>
+              </a:cxn>
+              <a:cxn ang="0">
+                <a:pos x="connsiteX3" y="connsiteY3"/>
+              </a:cxn>
+            </a:cxnLst>
+            <a:rect l="l" t="t" r="r" b="b"/>
+            <a:pathLst>
+              <a:path w="485775" h="854075">
+                <a:moveTo>
+                  <a:pt x="0" y="0"/>
+                </a:moveTo>
+                <a:lnTo>
+                  <a:pt x="409575" y="0"/>
+                </a:lnTo>
+                <a:lnTo>
+                  <a:pt x="409575" y="854075"/>
+                </a:lnTo>
+                <a:lnTo>
+                  <a:pt x="485775" y="854075"/>
+                </a:lnTo>
+              </a:path>
+            </a:pathLst>
+          </a:custGeom>
+          <a:noFill/>
+          <a:ln>
+            <a:solidFill>
+              <a:schemeClr val="accent1">
+                <a:lumMod val="60000"/>
+                <a:lumOff val="40000"/>
+              </a:schemeClr>
+            </a:solidFill>
+          </a:ln>
+        </p:spPr>
+        <p:style>
+          <a:lnRef idx="2">
+            <a:schemeClr val="accent1">
+              <a:shade val="50000"/>
+            </a:schemeClr>
+          </a:lnRef>
+          <a:fillRef idx="1">
+            <a:schemeClr val="accent1"/>
+          </a:fillRef>
+          <a:effectRef idx="0">
+            <a:schemeClr val="accent1"/>
+          </a:effectRef>
+          <a:fontRef idx="minor">
+            <a:schemeClr val="lt1"/>
+          </a:fontRef>
+        </p:style>
+        <p:txBody>
+          <a:bodyPr rtlCol="0" anchor="ctr"/>
+          <a:lstStyle/>
+          <a:p>
+            <a:pPr algn="ctr"/>
+            <a:endParaRPr lang="en-GB"/>
+          </a:p>
+        </p:txBody>
+      </p:sp>
+      <p:sp>
+        <p:nvSpPr>
+          <p:cNvPr id="3" name="Freeform: Shape 2">
+            <a:extLst>
+              <a:ext uri="{FF2B5EF4-FFF2-40B4-BE49-F238E27FC236}">
+                <a16:creationId xmlns:a16="http://schemas.microsoft.com/office/drawing/2014/main" id="{71BDE551-1EBB-498C-AEAC-982D356800C6}"/>
+              </a:ext>
+            </a:extLst>
+          </p:cNvPr>
+          <p:cNvSpPr/>
+          <p:nvPr/>
+        </p:nvSpPr>
+        <p:spPr>
+          <a:xfrm>
+            <a:off x="2689225" y="3714750"/>
+            <a:ext cx="850900" cy="857250"/>
+          </a:xfrm>
+          <a:custGeom>
+            <a:avLst/>
+            <a:gdLst>
+              <a:gd name="connsiteX0" fmla="*/ 0 w 850900"/>
+              <a:gd name="connsiteY0" fmla="*/ 0 h 857250"/>
+              <a:gd name="connsiteX1" fmla="*/ 219075 w 850900"/>
+              <a:gd name="connsiteY1" fmla="*/ 0 h 857250"/>
+              <a:gd name="connsiteX2" fmla="*/ 219075 w 850900"/>
+              <a:gd name="connsiteY2" fmla="*/ 857250 h 857250"/>
+              <a:gd name="connsiteX3" fmla="*/ 850900 w 850900"/>
+              <a:gd name="connsiteY3" fmla="*/ 857250 h 857250"/>
+            </a:gdLst>
+            <a:ahLst/>
+            <a:cxnLst>
+              <a:cxn ang="0">
+                <a:pos x="connsiteX0" y="connsiteY0"/>
+              </a:cxn>
+              <a:cxn ang="0">
+                <a:pos x="connsiteX1" y="connsiteY1"/>
+              </a:cxn>
+              <a:cxn ang="0">
+                <a:pos x="connsiteX2" y="connsiteY2"/>
+              </a:cxn>
+              <a:cxn ang="0">
+                <a:pos x="connsiteX3" y="connsiteY3"/>
+              </a:cxn>
+            </a:cxnLst>
+            <a:rect l="l" t="t" r="r" b="b"/>
+            <a:pathLst>
+              <a:path w="850900" h="857250">
+                <a:moveTo>
+                  <a:pt x="0" y="0"/>
+                </a:moveTo>
+                <a:lnTo>
+                  <a:pt x="219075" y="0"/>
+                </a:lnTo>
+                <a:lnTo>
+                  <a:pt x="219075" y="857250"/>
+                </a:lnTo>
+                <a:lnTo>
+                  <a:pt x="850900" y="857250"/>
+                </a:lnTo>
+              </a:path>
+            </a:pathLst>
+          </a:custGeom>
+          <a:noFill/>
+        </p:spPr>
+        <p:style>
+          <a:lnRef idx="2">
+            <a:schemeClr val="accent1">
+              <a:shade val="50000"/>
+            </a:schemeClr>
+          </a:lnRef>
+          <a:fillRef idx="1">
+            <a:schemeClr val="accent1"/>
+          </a:fillRef>
+          <a:effectRef idx="0">
+            <a:schemeClr val="accent1"/>
+          </a:effectRef>
+          <a:fontRef idx="minor">
+            <a:schemeClr val="lt1"/>
+          </a:fontRef>
+        </p:style>
+        <p:txBody>
+          <a:bodyPr rtlCol="0" anchor="ctr"/>
+          <a:lstStyle/>
+          <a:p>
+            <a:pPr algn="ctr"/>
+            <a:endParaRPr lang="en-GB"/>
+          </a:p>
+        </p:txBody>
+      </p:sp>
+      <p:pic>
+        <p:nvPicPr>
+          <p:cNvPr id="1030" name="Picture 6">
+            <a:extLst>
+              <a:ext uri="{FF2B5EF4-FFF2-40B4-BE49-F238E27FC236}">
+                <a16:creationId xmlns:a16="http://schemas.microsoft.com/office/drawing/2014/main" id="{BC0F8500-4DDB-4C14-9555-CAABB45A45ED}"/>
+              </a:ext>
+            </a:extLst>
+          </p:cNvPr>
+          <p:cNvPicPr>
+            <a:picLocks noChangeAspect="1" noChangeArrowheads="1"/>
+          </p:cNvPicPr>
+          <p:nvPr/>
+        </p:nvPicPr>
+        <p:blipFill>
+          <a:blip r:embed="rId5">
+            <a:extLst>
+              <a:ext uri="{28A0092B-C50C-407E-A947-70E740481C1C}">
+                <a14:useLocalDpi xmlns:a14="http://schemas.microsoft.com/office/drawing/2010/main" val="0"/>
+              </a:ext>
+            </a:extLst>
+          </a:blip>
+          <a:srcRect/>
+          <a:stretch/>
+        </p:blipFill>
+        <p:spPr bwMode="auto">
+          <a:xfrm>
+            <a:off x="1587149" y="3474454"/>
+            <a:ext cx="5614882" cy="3356498"/>
+          </a:xfrm>
+          <a:prstGeom prst="rect">
+            <a:avLst/>
+          </a:prstGeom>
+          <a:noFill/>
+          <a:extLst>
+            <a:ext uri="{909E8E84-426E-40DD-AFC4-6F175D3DCCD1}">
+              <a14:hiddenFill xmlns:a14="http://schemas.microsoft.com/office/drawing/2010/main">
+                <a:solidFill>
+                  <a:srgbClr val="FFFFFF"/>
+                </a:solidFill>
+              </a14:hiddenFill>
+            </a:ext>
+          </a:extLst>
+        </p:spPr>
+      </p:pic>
+      <p:sp>
+        <p:nvSpPr>
+          <p:cNvPr id="4" name="TextBox 3">
+            <a:extLst>
+              <a:ext uri="{FF2B5EF4-FFF2-40B4-BE49-F238E27FC236}">
+                <a16:creationId xmlns:a16="http://schemas.microsoft.com/office/drawing/2014/main" id="{978145B0-7A11-4ECB-9EA5-B19BE85300D2}"/>
+              </a:ext>
+            </a:extLst>
+          </p:cNvPr>
+          <p:cNvSpPr txBox="1"/>
+          <p:nvPr/>
+        </p:nvSpPr>
+        <p:spPr>
+          <a:xfrm>
+            <a:off x="10358477" y="3711388"/>
+            <a:ext cx="1059937" cy="369332"/>
+          </a:xfrm>
+          <a:prstGeom prst="rect">
+            <a:avLst/>
+          </a:prstGeom>
+          <a:noFill/>
+        </p:spPr>
+        <p:txBody>
+          <a:bodyPr wrap="square" rtlCol="0">
+            <a:spAutoFit/>
+          </a:bodyPr>
+          <a:lstStyle/>
+          <a:p>
+            <a:r>
+              <a:rPr lang="en-GB" dirty="0"/>
+              <a:t>M3 by 4</a:t>
+            </a:r>
+          </a:p>
+        </p:txBody>
+      </p:sp>
+      <p:sp>
+        <p:nvSpPr>
+          <p:cNvPr id="27" name="TextBox 26">
+            <a:extLst>
+              <a:ext uri="{FF2B5EF4-FFF2-40B4-BE49-F238E27FC236}">
+                <a16:creationId xmlns:a16="http://schemas.microsoft.com/office/drawing/2014/main" id="{426F5010-A946-409B-9743-75D92800F743}"/>
+              </a:ext>
+            </a:extLst>
+          </p:cNvPr>
+          <p:cNvSpPr txBox="1"/>
+          <p:nvPr/>
+        </p:nvSpPr>
+        <p:spPr>
+          <a:xfrm>
+            <a:off x="4451237" y="2488703"/>
+            <a:ext cx="1182744" cy="369332"/>
+          </a:xfrm>
+          <a:prstGeom prst="rect">
+            <a:avLst/>
+          </a:prstGeom>
+          <a:noFill/>
+        </p:spPr>
+        <p:txBody>
+          <a:bodyPr wrap="square" rtlCol="0">
+            <a:spAutoFit/>
+          </a:bodyPr>
+          <a:lstStyle/>
+          <a:p>
+            <a:r>
+              <a:rPr lang="en-GB" dirty="0"/>
+              <a:t>M3 by 2</a:t>
+            </a:r>
+          </a:p>
+        </p:txBody>
+      </p:sp>
+      <p:sp>
+        <p:nvSpPr>
+          <p:cNvPr id="28" name="TextBox 27">
+            <a:extLst>
+              <a:ext uri="{FF2B5EF4-FFF2-40B4-BE49-F238E27FC236}">
+                <a16:creationId xmlns:a16="http://schemas.microsoft.com/office/drawing/2014/main" id="{5D948885-7FCE-4B42-89D6-F3978A447591}"/>
+              </a:ext>
+            </a:extLst>
+          </p:cNvPr>
+          <p:cNvSpPr txBox="1"/>
+          <p:nvPr/>
+        </p:nvSpPr>
+        <p:spPr>
+          <a:xfrm>
+            <a:off x="145283" y="4229373"/>
+            <a:ext cx="1988317" cy="738664"/>
+          </a:xfrm>
+          <a:prstGeom prst="rect">
+            <a:avLst/>
+          </a:prstGeom>
+          <a:noFill/>
+        </p:spPr>
+        <p:txBody>
+          <a:bodyPr wrap="square" rtlCol="0">
+            <a:spAutoFit/>
+          </a:bodyPr>
+          <a:lstStyle/>
+          <a:p>
+            <a:r>
+              <a:rPr lang="en-GB" dirty="0"/>
+              <a:t>M2.5 by 3</a:t>
+            </a:r>
+          </a:p>
+          <a:p>
+            <a:r>
+              <a:rPr lang="en-GB" sz="1200" dirty="0"/>
+              <a:t>Rear access needed (battery)</a:t>
+            </a:r>
+          </a:p>
+          <a:p>
+            <a:r>
+              <a:rPr lang="en-GB" sz="1200" dirty="0"/>
+              <a:t>Could mount on pins</a:t>
+            </a:r>
+          </a:p>
+        </p:txBody>
+      </p:sp>
+      <p:sp>
+        <p:nvSpPr>
+          <p:cNvPr id="29" name="TextBox 28">
+            <a:extLst>
+              <a:ext uri="{FF2B5EF4-FFF2-40B4-BE49-F238E27FC236}">
+                <a16:creationId xmlns:a16="http://schemas.microsoft.com/office/drawing/2014/main" id="{96F12A09-2BE0-4DFF-9D52-DC5C53BC3B83}"/>
+              </a:ext>
+            </a:extLst>
+          </p:cNvPr>
+          <p:cNvSpPr txBox="1"/>
+          <p:nvPr/>
+        </p:nvSpPr>
+        <p:spPr>
+          <a:xfrm>
+            <a:off x="4070647" y="3108743"/>
+            <a:ext cx="1578492" cy="369332"/>
+          </a:xfrm>
+          <a:prstGeom prst="rect">
+            <a:avLst/>
+          </a:prstGeom>
+          <a:noFill/>
+        </p:spPr>
+        <p:txBody>
+          <a:bodyPr wrap="square" rtlCol="0">
+            <a:spAutoFit/>
+          </a:bodyPr>
+          <a:lstStyle/>
+          <a:p>
+            <a:r>
+              <a:rPr lang="en-GB" dirty="0"/>
+              <a:t>24-pin SIL only</a:t>
             </a:r>
           </a:p>
         </p:txBody>

</xml_diff>

<commit_message>
Changed pin allocation to use outputs!
</commit_message>
<xml_diff>
--- a/Wiring diagram.pptx
+++ b/Wiring diagram.pptx
@@ -261,7 +261,7 @@
           <a:p>
             <a:fld id="{3FF8DEA7-ACAB-4046-AEC2-2D128801CE29}" type="datetimeFigureOut">
               <a:rPr lang="en-GB" smtClean="0"/>
-              <a:t>26 Jul 20</a:t>
+              <a:t>3 Aug 20</a:t>
             </a:fld>
             <a:endParaRPr lang="en-GB"/>
           </a:p>
@@ -461,7 +461,7 @@
           <a:p>
             <a:fld id="{3FF8DEA7-ACAB-4046-AEC2-2D128801CE29}" type="datetimeFigureOut">
               <a:rPr lang="en-GB" smtClean="0"/>
-              <a:t>26 Jul 20</a:t>
+              <a:t>3 Aug 20</a:t>
             </a:fld>
             <a:endParaRPr lang="en-GB"/>
           </a:p>
@@ -671,7 +671,7 @@
           <a:p>
             <a:fld id="{3FF8DEA7-ACAB-4046-AEC2-2D128801CE29}" type="datetimeFigureOut">
               <a:rPr lang="en-GB" smtClean="0"/>
-              <a:t>26 Jul 20</a:t>
+              <a:t>3 Aug 20</a:t>
             </a:fld>
             <a:endParaRPr lang="en-GB"/>
           </a:p>
@@ -871,7 +871,7 @@
           <a:p>
             <a:fld id="{3FF8DEA7-ACAB-4046-AEC2-2D128801CE29}" type="datetimeFigureOut">
               <a:rPr lang="en-GB" smtClean="0"/>
-              <a:t>26 Jul 20</a:t>
+              <a:t>3 Aug 20</a:t>
             </a:fld>
             <a:endParaRPr lang="en-GB"/>
           </a:p>
@@ -1147,7 +1147,7 @@
           <a:p>
             <a:fld id="{3FF8DEA7-ACAB-4046-AEC2-2D128801CE29}" type="datetimeFigureOut">
               <a:rPr lang="en-GB" smtClean="0"/>
-              <a:t>26 Jul 20</a:t>
+              <a:t>3 Aug 20</a:t>
             </a:fld>
             <a:endParaRPr lang="en-GB"/>
           </a:p>
@@ -1415,7 +1415,7 @@
           <a:p>
             <a:fld id="{3FF8DEA7-ACAB-4046-AEC2-2D128801CE29}" type="datetimeFigureOut">
               <a:rPr lang="en-GB" smtClean="0"/>
-              <a:t>26 Jul 20</a:t>
+              <a:t>3 Aug 20</a:t>
             </a:fld>
             <a:endParaRPr lang="en-GB"/>
           </a:p>
@@ -1830,7 +1830,7 @@
           <a:p>
             <a:fld id="{3FF8DEA7-ACAB-4046-AEC2-2D128801CE29}" type="datetimeFigureOut">
               <a:rPr lang="en-GB" smtClean="0"/>
-              <a:t>26 Jul 20</a:t>
+              <a:t>3 Aug 20</a:t>
             </a:fld>
             <a:endParaRPr lang="en-GB"/>
           </a:p>
@@ -1972,7 +1972,7 @@
           <a:p>
             <a:fld id="{3FF8DEA7-ACAB-4046-AEC2-2D128801CE29}" type="datetimeFigureOut">
               <a:rPr lang="en-GB" smtClean="0"/>
-              <a:t>26 Jul 20</a:t>
+              <a:t>3 Aug 20</a:t>
             </a:fld>
             <a:endParaRPr lang="en-GB"/>
           </a:p>
@@ -2085,7 +2085,7 @@
           <a:p>
             <a:fld id="{3FF8DEA7-ACAB-4046-AEC2-2D128801CE29}" type="datetimeFigureOut">
               <a:rPr lang="en-GB" smtClean="0"/>
-              <a:t>26 Jul 20</a:t>
+              <a:t>3 Aug 20</a:t>
             </a:fld>
             <a:endParaRPr lang="en-GB"/>
           </a:p>
@@ -2398,7 +2398,7 @@
           <a:p>
             <a:fld id="{3FF8DEA7-ACAB-4046-AEC2-2D128801CE29}" type="datetimeFigureOut">
               <a:rPr lang="en-GB" smtClean="0"/>
-              <a:t>26 Jul 20</a:t>
+              <a:t>3 Aug 20</a:t>
             </a:fld>
             <a:endParaRPr lang="en-GB"/>
           </a:p>
@@ -2687,7 +2687,7 @@
           <a:p>
             <a:fld id="{3FF8DEA7-ACAB-4046-AEC2-2D128801CE29}" type="datetimeFigureOut">
               <a:rPr lang="en-GB" smtClean="0"/>
-              <a:t>26 Jul 20</a:t>
+              <a:t>3 Aug 20</a:t>
             </a:fld>
             <a:endParaRPr lang="en-GB"/>
           </a:p>
@@ -2930,7 +2930,7 @@
           <a:p>
             <a:fld id="{3FF8DEA7-ACAB-4046-AEC2-2D128801CE29}" type="datetimeFigureOut">
               <a:rPr lang="en-GB" smtClean="0"/>
-              <a:t>26 Jul 20</a:t>
+              <a:t>3 Aug 20</a:t>
             </a:fld>
             <a:endParaRPr lang="en-GB"/>
           </a:p>
@@ -4383,8 +4383,8 @@
         </p:nvSpPr>
         <p:spPr>
           <a:xfrm>
-            <a:off x="6362700" y="3467100"/>
-            <a:ext cx="3695700" cy="922025"/>
+            <a:off x="7188716" y="3467100"/>
+            <a:ext cx="2869684" cy="1878067"/>
           </a:xfrm>
           <a:custGeom>
             <a:avLst/>
@@ -4471,8 +4471,8 @@
         </p:nvSpPr>
         <p:spPr>
           <a:xfrm>
-            <a:off x="6362699" y="3456231"/>
-            <a:ext cx="3503691" cy="804619"/>
+            <a:off x="7188716" y="3456231"/>
+            <a:ext cx="2677674" cy="1734894"/>
           </a:xfrm>
           <a:custGeom>
             <a:avLst/>
@@ -4559,8 +4559,8 @@
         </p:nvSpPr>
         <p:spPr>
           <a:xfrm>
-            <a:off x="6781800" y="3456231"/>
-            <a:ext cx="2892580" cy="639519"/>
+            <a:off x="7188716" y="3456231"/>
+            <a:ext cx="2485664" cy="1586016"/>
           </a:xfrm>
           <a:custGeom>
             <a:avLst/>

</xml_diff>

<commit_message>
Added code to read the hand position sensor
</commit_message>
<xml_diff>
--- a/Wiring diagram.pptx
+++ b/Wiring diagram.pptx
@@ -6,6 +6,7 @@
   </p:sldMasterIdLst>
   <p:sldIdLst>
     <p:sldId id="256" r:id="rId2"/>
+    <p:sldId id="257" r:id="rId3"/>
   </p:sldIdLst>
   <p:sldSz cx="12192000" cy="6858000"/>
   <p:notesSz cx="6858000" cy="9144000"/>
@@ -261,7 +262,7 @@
           <a:p>
             <a:fld id="{3FF8DEA7-ACAB-4046-AEC2-2D128801CE29}" type="datetimeFigureOut">
               <a:rPr lang="en-GB" smtClean="0"/>
-              <a:t>3 Aug 20</a:t>
+              <a:t>6 Dec 20</a:t>
             </a:fld>
             <a:endParaRPr lang="en-GB"/>
           </a:p>
@@ -461,7 +462,7 @@
           <a:p>
             <a:fld id="{3FF8DEA7-ACAB-4046-AEC2-2D128801CE29}" type="datetimeFigureOut">
               <a:rPr lang="en-GB" smtClean="0"/>
-              <a:t>3 Aug 20</a:t>
+              <a:t>6 Dec 20</a:t>
             </a:fld>
             <a:endParaRPr lang="en-GB"/>
           </a:p>
@@ -671,7 +672,7 @@
           <a:p>
             <a:fld id="{3FF8DEA7-ACAB-4046-AEC2-2D128801CE29}" type="datetimeFigureOut">
               <a:rPr lang="en-GB" smtClean="0"/>
-              <a:t>3 Aug 20</a:t>
+              <a:t>6 Dec 20</a:t>
             </a:fld>
             <a:endParaRPr lang="en-GB"/>
           </a:p>
@@ -871,7 +872,7 @@
           <a:p>
             <a:fld id="{3FF8DEA7-ACAB-4046-AEC2-2D128801CE29}" type="datetimeFigureOut">
               <a:rPr lang="en-GB" smtClean="0"/>
-              <a:t>3 Aug 20</a:t>
+              <a:t>6 Dec 20</a:t>
             </a:fld>
             <a:endParaRPr lang="en-GB"/>
           </a:p>
@@ -1147,7 +1148,7 @@
           <a:p>
             <a:fld id="{3FF8DEA7-ACAB-4046-AEC2-2D128801CE29}" type="datetimeFigureOut">
               <a:rPr lang="en-GB" smtClean="0"/>
-              <a:t>3 Aug 20</a:t>
+              <a:t>6 Dec 20</a:t>
             </a:fld>
             <a:endParaRPr lang="en-GB"/>
           </a:p>
@@ -1415,7 +1416,7 @@
           <a:p>
             <a:fld id="{3FF8DEA7-ACAB-4046-AEC2-2D128801CE29}" type="datetimeFigureOut">
               <a:rPr lang="en-GB" smtClean="0"/>
-              <a:t>3 Aug 20</a:t>
+              <a:t>6 Dec 20</a:t>
             </a:fld>
             <a:endParaRPr lang="en-GB"/>
           </a:p>
@@ -1830,7 +1831,7 @@
           <a:p>
             <a:fld id="{3FF8DEA7-ACAB-4046-AEC2-2D128801CE29}" type="datetimeFigureOut">
               <a:rPr lang="en-GB" smtClean="0"/>
-              <a:t>3 Aug 20</a:t>
+              <a:t>6 Dec 20</a:t>
             </a:fld>
             <a:endParaRPr lang="en-GB"/>
           </a:p>
@@ -1972,7 +1973,7 @@
           <a:p>
             <a:fld id="{3FF8DEA7-ACAB-4046-AEC2-2D128801CE29}" type="datetimeFigureOut">
               <a:rPr lang="en-GB" smtClean="0"/>
-              <a:t>3 Aug 20</a:t>
+              <a:t>6 Dec 20</a:t>
             </a:fld>
             <a:endParaRPr lang="en-GB"/>
           </a:p>
@@ -2085,7 +2086,7 @@
           <a:p>
             <a:fld id="{3FF8DEA7-ACAB-4046-AEC2-2D128801CE29}" type="datetimeFigureOut">
               <a:rPr lang="en-GB" smtClean="0"/>
-              <a:t>3 Aug 20</a:t>
+              <a:t>6 Dec 20</a:t>
             </a:fld>
             <a:endParaRPr lang="en-GB"/>
           </a:p>
@@ -2398,7 +2399,7 @@
           <a:p>
             <a:fld id="{3FF8DEA7-ACAB-4046-AEC2-2D128801CE29}" type="datetimeFigureOut">
               <a:rPr lang="en-GB" smtClean="0"/>
-              <a:t>3 Aug 20</a:t>
+              <a:t>6 Dec 20</a:t>
             </a:fld>
             <a:endParaRPr lang="en-GB"/>
           </a:p>
@@ -2687,7 +2688,7 @@
           <a:p>
             <a:fld id="{3FF8DEA7-ACAB-4046-AEC2-2D128801CE29}" type="datetimeFigureOut">
               <a:rPr lang="en-GB" smtClean="0"/>
-              <a:t>3 Aug 20</a:t>
+              <a:t>6 Dec 20</a:t>
             </a:fld>
             <a:endParaRPr lang="en-GB"/>
           </a:p>
@@ -2930,7 +2931,7 @@
           <a:p>
             <a:fld id="{3FF8DEA7-ACAB-4046-AEC2-2D128801CE29}" type="datetimeFigureOut">
               <a:rPr lang="en-GB" smtClean="0"/>
-              <a:t>3 Aug 20</a:t>
+              <a:t>6 Dec 20</a:t>
             </a:fld>
             <a:endParaRPr lang="en-GB"/>
           </a:p>
@@ -3804,7 +3805,7 @@
         <p:spPr>
           <a:xfrm>
             <a:off x="5857592" y="3467477"/>
-            <a:ext cx="3512745" cy="2199992"/>
+            <a:ext cx="3512745" cy="2195136"/>
           </a:xfrm>
           <a:custGeom>
             <a:avLst/>
@@ -5242,10 +5243,1163 @@
           </a:p>
         </p:txBody>
       </p:sp>
+      <p:pic>
+        <p:nvPicPr>
+          <p:cNvPr id="21" name="Picture 20">
+            <a:extLst>
+              <a:ext uri="{FF2B5EF4-FFF2-40B4-BE49-F238E27FC236}">
+                <a16:creationId xmlns:a16="http://schemas.microsoft.com/office/drawing/2014/main" id="{7279E8C4-9638-49B4-815E-65309D03D364}"/>
+              </a:ext>
+            </a:extLst>
+          </p:cNvPr>
+          <p:cNvPicPr>
+            <a:picLocks noChangeAspect="1"/>
+          </p:cNvPicPr>
+          <p:nvPr/>
+        </p:nvPicPr>
+        <p:blipFill>
+          <a:blip r:embed="rId6"/>
+          <a:stretch>
+            <a:fillRect/>
+          </a:stretch>
+        </p:blipFill>
+        <p:spPr>
+          <a:xfrm>
+            <a:off x="8752347" y="5813825"/>
+            <a:ext cx="2090946" cy="859805"/>
+          </a:xfrm>
+          <a:prstGeom prst="rect">
+            <a:avLst/>
+          </a:prstGeom>
+        </p:spPr>
+      </p:pic>
+      <p:cxnSp>
+        <p:nvCxnSpPr>
+          <p:cNvPr id="24" name="Connector: Elbow 23">
+            <a:extLst>
+              <a:ext uri="{FF2B5EF4-FFF2-40B4-BE49-F238E27FC236}">
+                <a16:creationId xmlns:a16="http://schemas.microsoft.com/office/drawing/2014/main" id="{F4C584CB-8615-434A-B9DE-22169AADBF53}"/>
+              </a:ext>
+            </a:extLst>
+          </p:cNvPr>
+          <p:cNvCxnSpPr>
+            <a:cxnSpLocks/>
+          </p:cNvCxnSpPr>
+          <p:nvPr/>
+        </p:nvCxnSpPr>
+        <p:spPr>
+          <a:xfrm>
+            <a:off x="5940541" y="3929204"/>
+            <a:ext cx="2836747" cy="2513976"/>
+          </a:xfrm>
+          <a:prstGeom prst="bentConnector3">
+            <a:avLst>
+              <a:gd name="adj1" fmla="val 7525"/>
+            </a:avLst>
+          </a:prstGeom>
+          <a:noFill/>
+          <a:ln w="38100">
+            <a:solidFill>
+              <a:srgbClr val="FFFF00"/>
+            </a:solidFill>
+          </a:ln>
+        </p:spPr>
+        <p:style>
+          <a:lnRef idx="2">
+            <a:schemeClr val="accent1">
+              <a:shade val="50000"/>
+            </a:schemeClr>
+          </a:lnRef>
+          <a:fillRef idx="1">
+            <a:schemeClr val="accent1"/>
+          </a:fillRef>
+          <a:effectRef idx="0">
+            <a:schemeClr val="accent1"/>
+          </a:effectRef>
+          <a:fontRef idx="minor">
+            <a:schemeClr val="lt1"/>
+          </a:fontRef>
+        </p:style>
+      </p:cxnSp>
+      <p:cxnSp>
+        <p:nvCxnSpPr>
+          <p:cNvPr id="34" name="Connector: Elbow 33">
+            <a:extLst>
+              <a:ext uri="{FF2B5EF4-FFF2-40B4-BE49-F238E27FC236}">
+                <a16:creationId xmlns:a16="http://schemas.microsoft.com/office/drawing/2014/main" id="{5E5D4BC8-BEEB-45FB-88EE-2060632BFC37}"/>
+              </a:ext>
+            </a:extLst>
+          </p:cNvPr>
+          <p:cNvCxnSpPr>
+            <a:cxnSpLocks/>
+          </p:cNvCxnSpPr>
+          <p:nvPr/>
+        </p:nvCxnSpPr>
+        <p:spPr>
+          <a:xfrm>
+            <a:off x="5940541" y="5506322"/>
+            <a:ext cx="2812934" cy="803991"/>
+          </a:xfrm>
+          <a:prstGeom prst="bentConnector3">
+            <a:avLst>
+              <a:gd name="adj1" fmla="val 50000"/>
+            </a:avLst>
+          </a:prstGeom>
+          <a:noFill/>
+          <a:ln w="57150">
+            <a:solidFill>
+              <a:schemeClr val="tx1"/>
+            </a:solidFill>
+          </a:ln>
+        </p:spPr>
+        <p:style>
+          <a:lnRef idx="2">
+            <a:schemeClr val="accent1">
+              <a:shade val="50000"/>
+            </a:schemeClr>
+          </a:lnRef>
+          <a:fillRef idx="1">
+            <a:schemeClr val="accent1"/>
+          </a:fillRef>
+          <a:effectRef idx="0">
+            <a:schemeClr val="accent1"/>
+          </a:effectRef>
+          <a:fontRef idx="minor">
+            <a:schemeClr val="lt1"/>
+          </a:fontRef>
+        </p:style>
+      </p:cxnSp>
+      <p:cxnSp>
+        <p:nvCxnSpPr>
+          <p:cNvPr id="37" name="Connector: Elbow 36">
+            <a:extLst>
+              <a:ext uri="{FF2B5EF4-FFF2-40B4-BE49-F238E27FC236}">
+                <a16:creationId xmlns:a16="http://schemas.microsoft.com/office/drawing/2014/main" id="{6470E03C-902A-4BEA-A678-960AC8DD3EA5}"/>
+              </a:ext>
+            </a:extLst>
+          </p:cNvPr>
+          <p:cNvCxnSpPr>
+            <a:cxnSpLocks/>
+          </p:cNvCxnSpPr>
+          <p:nvPr/>
+        </p:nvCxnSpPr>
+        <p:spPr>
+          <a:xfrm>
+            <a:off x="7188716" y="4704915"/>
+            <a:ext cx="1563323" cy="1455379"/>
+          </a:xfrm>
+          <a:prstGeom prst="bentConnector3">
+            <a:avLst>
+              <a:gd name="adj1" fmla="val 50000"/>
+            </a:avLst>
+          </a:prstGeom>
+          <a:noFill/>
+          <a:ln w="28575">
+            <a:solidFill>
+              <a:schemeClr val="accent5">
+                <a:lumMod val="75000"/>
+              </a:schemeClr>
+            </a:solidFill>
+          </a:ln>
+        </p:spPr>
+        <p:style>
+          <a:lnRef idx="2">
+            <a:schemeClr val="accent1">
+              <a:shade val="50000"/>
+            </a:schemeClr>
+          </a:lnRef>
+          <a:fillRef idx="1">
+            <a:schemeClr val="accent1"/>
+          </a:fillRef>
+          <a:effectRef idx="0">
+            <a:schemeClr val="accent1"/>
+          </a:effectRef>
+          <a:fontRef idx="minor">
+            <a:schemeClr val="lt1"/>
+          </a:fontRef>
+        </p:style>
+      </p:cxnSp>
     </p:spTree>
     <p:extLst>
       <p:ext uri="{BB962C8B-B14F-4D97-AF65-F5344CB8AC3E}">
         <p14:creationId xmlns:p14="http://schemas.microsoft.com/office/powerpoint/2010/main" val="2448838398"/>
+      </p:ext>
+    </p:extLst>
+  </p:cSld>
+  <p:clrMapOvr>
+    <a:masterClrMapping/>
+  </p:clrMapOvr>
+</p:sld>
+</file>
+
+<file path=ppt/slides/slide2.xml><?xml version="1.0" encoding="utf-8"?>
+<p:sld xmlns:a="http://schemas.openxmlformats.org/drawingml/2006/main" xmlns:r="http://schemas.openxmlformats.org/officeDocument/2006/relationships" xmlns:p="http://schemas.openxmlformats.org/presentationml/2006/main">
+  <p:cSld>
+    <p:spTree>
+      <p:nvGrpSpPr>
+        <p:cNvPr id="1" name=""/>
+        <p:cNvGrpSpPr/>
+        <p:nvPr/>
+      </p:nvGrpSpPr>
+      <p:grpSpPr>
+        <a:xfrm>
+          <a:off x="0" y="0"/>
+          <a:ext cx="0" cy="0"/>
+          <a:chOff x="0" y="0"/>
+          <a:chExt cx="0" cy="0"/>
+        </a:xfrm>
+      </p:grpSpPr>
+      <p:sp>
+        <p:nvSpPr>
+          <p:cNvPr id="2" name="Rectangle 1">
+            <a:extLst>
+              <a:ext uri="{FF2B5EF4-FFF2-40B4-BE49-F238E27FC236}">
+                <a16:creationId xmlns:a16="http://schemas.microsoft.com/office/drawing/2014/main" id="{49F32A67-E904-4043-8573-167470E3180C}"/>
+              </a:ext>
+            </a:extLst>
+          </p:cNvPr>
+          <p:cNvSpPr/>
+          <p:nvPr/>
+        </p:nvSpPr>
+        <p:spPr>
+          <a:xfrm>
+            <a:off x="1973655" y="1267485"/>
+            <a:ext cx="1711105" cy="534155"/>
+          </a:xfrm>
+          <a:prstGeom prst="rect">
+            <a:avLst/>
+          </a:prstGeom>
+          <a:solidFill>
+            <a:schemeClr val="bg1">
+              <a:lumMod val="85000"/>
+            </a:schemeClr>
+          </a:solidFill>
+        </p:spPr>
+        <p:style>
+          <a:lnRef idx="2">
+            <a:schemeClr val="accent1">
+              <a:shade val="50000"/>
+            </a:schemeClr>
+          </a:lnRef>
+          <a:fillRef idx="1">
+            <a:schemeClr val="accent1"/>
+          </a:fillRef>
+          <a:effectRef idx="0">
+            <a:schemeClr val="accent1"/>
+          </a:effectRef>
+          <a:fontRef idx="minor">
+            <a:schemeClr val="lt1"/>
+          </a:fontRef>
+        </p:style>
+        <p:txBody>
+          <a:bodyPr rtlCol="0" anchor="ctr"/>
+          <a:lstStyle/>
+          <a:p>
+            <a:pPr algn="ctr"/>
+            <a:r>
+              <a:rPr lang="en-GB" dirty="0">
+                <a:solidFill>
+                  <a:schemeClr val="tx1"/>
+                </a:solidFill>
+              </a:rPr>
+              <a:t>0</a:t>
+            </a:r>
+          </a:p>
+        </p:txBody>
+      </p:sp>
+      <p:sp>
+        <p:nvSpPr>
+          <p:cNvPr id="3" name="Rectangle 2">
+            <a:extLst>
+              <a:ext uri="{FF2B5EF4-FFF2-40B4-BE49-F238E27FC236}">
+                <a16:creationId xmlns:a16="http://schemas.microsoft.com/office/drawing/2014/main" id="{3318CA45-B29B-469A-9124-5C1E06471680}"/>
+              </a:ext>
+            </a:extLst>
+          </p:cNvPr>
+          <p:cNvSpPr/>
+          <p:nvPr/>
+        </p:nvSpPr>
+        <p:spPr>
+          <a:xfrm>
+            <a:off x="3684760" y="1267485"/>
+            <a:ext cx="1711105" cy="534155"/>
+          </a:xfrm>
+          <a:prstGeom prst="rect">
+            <a:avLst/>
+          </a:prstGeom>
+          <a:solidFill>
+            <a:schemeClr val="bg2">
+              <a:lumMod val="25000"/>
+            </a:schemeClr>
+          </a:solidFill>
+        </p:spPr>
+        <p:style>
+          <a:lnRef idx="2">
+            <a:schemeClr val="accent1">
+              <a:shade val="50000"/>
+            </a:schemeClr>
+          </a:lnRef>
+          <a:fillRef idx="1">
+            <a:schemeClr val="accent1"/>
+          </a:fillRef>
+          <a:effectRef idx="0">
+            <a:schemeClr val="accent1"/>
+          </a:effectRef>
+          <a:fontRef idx="minor">
+            <a:schemeClr val="lt1"/>
+          </a:fontRef>
+        </p:style>
+        <p:txBody>
+          <a:bodyPr rtlCol="0" anchor="ctr"/>
+          <a:lstStyle/>
+          <a:p>
+            <a:pPr algn="ctr"/>
+            <a:r>
+              <a:rPr lang="en-GB" dirty="0"/>
+              <a:t>1</a:t>
+            </a:r>
+          </a:p>
+        </p:txBody>
+      </p:sp>
+      <p:sp>
+        <p:nvSpPr>
+          <p:cNvPr id="4" name="Rectangle 3">
+            <a:extLst>
+              <a:ext uri="{FF2B5EF4-FFF2-40B4-BE49-F238E27FC236}">
+                <a16:creationId xmlns:a16="http://schemas.microsoft.com/office/drawing/2014/main" id="{9E3D5667-0EEC-4D34-8E7D-25159E880725}"/>
+              </a:ext>
+            </a:extLst>
+          </p:cNvPr>
+          <p:cNvSpPr/>
+          <p:nvPr/>
+        </p:nvSpPr>
+        <p:spPr>
+          <a:xfrm>
+            <a:off x="5395865" y="1267484"/>
+            <a:ext cx="1711105" cy="534155"/>
+          </a:xfrm>
+          <a:prstGeom prst="rect">
+            <a:avLst/>
+          </a:prstGeom>
+          <a:solidFill>
+            <a:schemeClr val="bg2">
+              <a:lumMod val="25000"/>
+            </a:schemeClr>
+          </a:solidFill>
+        </p:spPr>
+        <p:style>
+          <a:lnRef idx="2">
+            <a:schemeClr val="accent1">
+              <a:shade val="50000"/>
+            </a:schemeClr>
+          </a:lnRef>
+          <a:fillRef idx="1">
+            <a:schemeClr val="accent1"/>
+          </a:fillRef>
+          <a:effectRef idx="0">
+            <a:schemeClr val="accent1"/>
+          </a:effectRef>
+          <a:fontRef idx="minor">
+            <a:schemeClr val="lt1"/>
+          </a:fontRef>
+        </p:style>
+        <p:txBody>
+          <a:bodyPr rtlCol="0" anchor="ctr"/>
+          <a:lstStyle/>
+          <a:p>
+            <a:pPr algn="ctr"/>
+            <a:r>
+              <a:rPr lang="en-GB" dirty="0"/>
+              <a:t>2</a:t>
+            </a:r>
+          </a:p>
+        </p:txBody>
+      </p:sp>
+      <p:sp>
+        <p:nvSpPr>
+          <p:cNvPr id="5" name="Rectangle 4">
+            <a:extLst>
+              <a:ext uri="{FF2B5EF4-FFF2-40B4-BE49-F238E27FC236}">
+                <a16:creationId xmlns:a16="http://schemas.microsoft.com/office/drawing/2014/main" id="{E7410520-09C5-407C-B6B4-8B87C0BD2B1C}"/>
+              </a:ext>
+            </a:extLst>
+          </p:cNvPr>
+          <p:cNvSpPr/>
+          <p:nvPr/>
+        </p:nvSpPr>
+        <p:spPr>
+          <a:xfrm>
+            <a:off x="7106970" y="1267483"/>
+            <a:ext cx="1711105" cy="534155"/>
+          </a:xfrm>
+          <a:prstGeom prst="rect">
+            <a:avLst/>
+          </a:prstGeom>
+          <a:solidFill>
+            <a:schemeClr val="bg2">
+              <a:lumMod val="25000"/>
+            </a:schemeClr>
+          </a:solidFill>
+          <a:ln w="57150">
+            <a:solidFill>
+              <a:schemeClr val="accent4">
+                <a:lumMod val="60000"/>
+                <a:lumOff val="40000"/>
+              </a:schemeClr>
+            </a:solidFill>
+          </a:ln>
+        </p:spPr>
+        <p:style>
+          <a:lnRef idx="2">
+            <a:schemeClr val="accent1">
+              <a:shade val="50000"/>
+            </a:schemeClr>
+          </a:lnRef>
+          <a:fillRef idx="1">
+            <a:schemeClr val="accent1"/>
+          </a:fillRef>
+          <a:effectRef idx="0">
+            <a:schemeClr val="accent1"/>
+          </a:effectRef>
+          <a:fontRef idx="minor">
+            <a:schemeClr val="lt1"/>
+          </a:fontRef>
+        </p:style>
+        <p:txBody>
+          <a:bodyPr rtlCol="0" anchor="ctr"/>
+          <a:lstStyle/>
+          <a:p>
+            <a:pPr algn="ctr"/>
+            <a:r>
+              <a:rPr lang="en-GB" dirty="0"/>
+              <a:t>3</a:t>
+            </a:r>
+          </a:p>
+        </p:txBody>
+      </p:sp>
+      <p:sp>
+        <p:nvSpPr>
+          <p:cNvPr id="6" name="Rectangle 5">
+            <a:extLst>
+              <a:ext uri="{FF2B5EF4-FFF2-40B4-BE49-F238E27FC236}">
+                <a16:creationId xmlns:a16="http://schemas.microsoft.com/office/drawing/2014/main" id="{CD54D75F-17BF-4BA4-8CCD-A5114FF621EE}"/>
+              </a:ext>
+            </a:extLst>
+          </p:cNvPr>
+          <p:cNvSpPr/>
+          <p:nvPr/>
+        </p:nvSpPr>
+        <p:spPr>
+          <a:xfrm>
+            <a:off x="8818075" y="1267483"/>
+            <a:ext cx="1711105" cy="534155"/>
+          </a:xfrm>
+          <a:prstGeom prst="rect">
+            <a:avLst/>
+          </a:prstGeom>
+          <a:solidFill>
+            <a:schemeClr val="bg1">
+              <a:lumMod val="85000"/>
+            </a:schemeClr>
+          </a:solidFill>
+          <a:ln w="57150">
+            <a:solidFill>
+              <a:schemeClr val="accent4">
+                <a:lumMod val="60000"/>
+                <a:lumOff val="40000"/>
+              </a:schemeClr>
+            </a:solidFill>
+          </a:ln>
+        </p:spPr>
+        <p:style>
+          <a:lnRef idx="2">
+            <a:schemeClr val="accent1">
+              <a:shade val="50000"/>
+            </a:schemeClr>
+          </a:lnRef>
+          <a:fillRef idx="1">
+            <a:schemeClr val="accent1"/>
+          </a:fillRef>
+          <a:effectRef idx="0">
+            <a:schemeClr val="accent1"/>
+          </a:effectRef>
+          <a:fontRef idx="minor">
+            <a:schemeClr val="lt1"/>
+          </a:fontRef>
+        </p:style>
+        <p:txBody>
+          <a:bodyPr rtlCol="0" anchor="ctr"/>
+          <a:lstStyle/>
+          <a:p>
+            <a:pPr algn="ctr"/>
+            <a:r>
+              <a:rPr lang="en-GB" dirty="0">
+                <a:solidFill>
+                  <a:schemeClr val="tx1"/>
+                </a:solidFill>
+              </a:rPr>
+              <a:t>0</a:t>
+            </a:r>
+          </a:p>
+        </p:txBody>
+      </p:sp>
+      <p:sp>
+        <p:nvSpPr>
+          <p:cNvPr id="7" name="Rectangle 6">
+            <a:extLst>
+              <a:ext uri="{FF2B5EF4-FFF2-40B4-BE49-F238E27FC236}">
+                <a16:creationId xmlns:a16="http://schemas.microsoft.com/office/drawing/2014/main" id="{B0AFBF00-5233-40A5-852E-DF1BAFA618E1}"/>
+              </a:ext>
+            </a:extLst>
+          </p:cNvPr>
+          <p:cNvSpPr/>
+          <p:nvPr/>
+        </p:nvSpPr>
+        <p:spPr>
+          <a:xfrm>
+            <a:off x="1973655" y="1267484"/>
+            <a:ext cx="1711105" cy="534155"/>
+          </a:xfrm>
+          <a:prstGeom prst="rect">
+            <a:avLst/>
+          </a:prstGeom>
+          <a:solidFill>
+            <a:schemeClr val="bg1">
+              <a:lumMod val="85000"/>
+            </a:schemeClr>
+          </a:solidFill>
+          <a:ln w="57150">
+            <a:solidFill>
+              <a:schemeClr val="accent4">
+                <a:lumMod val="60000"/>
+                <a:lumOff val="40000"/>
+              </a:schemeClr>
+            </a:solidFill>
+          </a:ln>
+        </p:spPr>
+        <p:style>
+          <a:lnRef idx="2">
+            <a:schemeClr val="accent1">
+              <a:shade val="50000"/>
+            </a:schemeClr>
+          </a:lnRef>
+          <a:fillRef idx="1">
+            <a:schemeClr val="accent1"/>
+          </a:fillRef>
+          <a:effectRef idx="0">
+            <a:schemeClr val="accent1"/>
+          </a:effectRef>
+          <a:fontRef idx="minor">
+            <a:schemeClr val="lt1"/>
+          </a:fontRef>
+        </p:style>
+        <p:txBody>
+          <a:bodyPr rtlCol="0" anchor="ctr"/>
+          <a:lstStyle/>
+          <a:p>
+            <a:pPr algn="ctr"/>
+            <a:r>
+              <a:rPr lang="en-GB" dirty="0">
+                <a:solidFill>
+                  <a:schemeClr val="tx1"/>
+                </a:solidFill>
+              </a:rPr>
+              <a:t>0</a:t>
+            </a:r>
+          </a:p>
+        </p:txBody>
+      </p:sp>
+      <p:sp>
+        <p:nvSpPr>
+          <p:cNvPr id="8" name="Rectangle 7">
+            <a:extLst>
+              <a:ext uri="{FF2B5EF4-FFF2-40B4-BE49-F238E27FC236}">
+                <a16:creationId xmlns:a16="http://schemas.microsoft.com/office/drawing/2014/main" id="{FB2B5A89-B4CB-478F-ACB9-EC7C2F17CB62}"/>
+              </a:ext>
+            </a:extLst>
+          </p:cNvPr>
+          <p:cNvSpPr/>
+          <p:nvPr/>
+        </p:nvSpPr>
+        <p:spPr>
+          <a:xfrm>
+            <a:off x="3684760" y="1267484"/>
+            <a:ext cx="1711105" cy="534155"/>
+          </a:xfrm>
+          <a:prstGeom prst="rect">
+            <a:avLst/>
+          </a:prstGeom>
+          <a:solidFill>
+            <a:schemeClr val="bg2">
+              <a:lumMod val="25000"/>
+            </a:schemeClr>
+          </a:solidFill>
+          <a:ln w="57150">
+            <a:solidFill>
+              <a:schemeClr val="accent4">
+                <a:lumMod val="60000"/>
+                <a:lumOff val="40000"/>
+              </a:schemeClr>
+            </a:solidFill>
+          </a:ln>
+        </p:spPr>
+        <p:style>
+          <a:lnRef idx="2">
+            <a:schemeClr val="accent1">
+              <a:shade val="50000"/>
+            </a:schemeClr>
+          </a:lnRef>
+          <a:fillRef idx="1">
+            <a:schemeClr val="accent1"/>
+          </a:fillRef>
+          <a:effectRef idx="0">
+            <a:schemeClr val="accent1"/>
+          </a:effectRef>
+          <a:fontRef idx="minor">
+            <a:schemeClr val="lt1"/>
+          </a:fontRef>
+        </p:style>
+        <p:txBody>
+          <a:bodyPr rtlCol="0" anchor="ctr"/>
+          <a:lstStyle/>
+          <a:p>
+            <a:pPr algn="ctr"/>
+            <a:r>
+              <a:rPr lang="en-GB" dirty="0"/>
+              <a:t>1</a:t>
+            </a:r>
+          </a:p>
+        </p:txBody>
+      </p:sp>
+      <p:sp>
+        <p:nvSpPr>
+          <p:cNvPr id="9" name="Rectangle 8">
+            <a:extLst>
+              <a:ext uri="{FF2B5EF4-FFF2-40B4-BE49-F238E27FC236}">
+                <a16:creationId xmlns:a16="http://schemas.microsoft.com/office/drawing/2014/main" id="{39A07C27-22DC-4BEE-92B4-5A3C4B673AE2}"/>
+              </a:ext>
+            </a:extLst>
+          </p:cNvPr>
+          <p:cNvSpPr/>
+          <p:nvPr/>
+        </p:nvSpPr>
+        <p:spPr>
+          <a:xfrm>
+            <a:off x="5395865" y="1267483"/>
+            <a:ext cx="1711105" cy="534155"/>
+          </a:xfrm>
+          <a:prstGeom prst="rect">
+            <a:avLst/>
+          </a:prstGeom>
+          <a:solidFill>
+            <a:schemeClr val="bg2">
+              <a:lumMod val="25000"/>
+            </a:schemeClr>
+          </a:solidFill>
+          <a:ln w="57150">
+            <a:solidFill>
+              <a:schemeClr val="accent4">
+                <a:lumMod val="60000"/>
+                <a:lumOff val="40000"/>
+              </a:schemeClr>
+            </a:solidFill>
+          </a:ln>
+        </p:spPr>
+        <p:style>
+          <a:lnRef idx="2">
+            <a:schemeClr val="accent1">
+              <a:shade val="50000"/>
+            </a:schemeClr>
+          </a:lnRef>
+          <a:fillRef idx="1">
+            <a:schemeClr val="accent1"/>
+          </a:fillRef>
+          <a:effectRef idx="0">
+            <a:schemeClr val="accent1"/>
+          </a:effectRef>
+          <a:fontRef idx="minor">
+            <a:schemeClr val="lt1"/>
+          </a:fontRef>
+        </p:style>
+        <p:txBody>
+          <a:bodyPr rtlCol="0" anchor="ctr"/>
+          <a:lstStyle/>
+          <a:p>
+            <a:pPr algn="ctr"/>
+            <a:r>
+              <a:rPr lang="en-GB" dirty="0"/>
+              <a:t>2</a:t>
+            </a:r>
+          </a:p>
+        </p:txBody>
+      </p:sp>
+      <p:sp>
+        <p:nvSpPr>
+          <p:cNvPr id="10" name="Freeform: Shape 9">
+            <a:extLst>
+              <a:ext uri="{FF2B5EF4-FFF2-40B4-BE49-F238E27FC236}">
+                <a16:creationId xmlns:a16="http://schemas.microsoft.com/office/drawing/2014/main" id="{762FBBAC-23A4-4966-96EF-F7D19DF3873D}"/>
+              </a:ext>
+            </a:extLst>
+          </p:cNvPr>
+          <p:cNvSpPr/>
+          <p:nvPr/>
+        </p:nvSpPr>
+        <p:spPr>
+          <a:xfrm>
+            <a:off x="1955549" y="2100404"/>
+            <a:ext cx="8528364" cy="660903"/>
+          </a:xfrm>
+          <a:custGeom>
+            <a:avLst/>
+            <a:gdLst>
+              <a:gd name="connsiteX0" fmla="*/ 0 w 8528364"/>
+              <a:gd name="connsiteY0" fmla="*/ 9053 h 660903"/>
+              <a:gd name="connsiteX1" fmla="*/ 1747318 w 8528364"/>
+              <a:gd name="connsiteY1" fmla="*/ 9053 h 660903"/>
+              <a:gd name="connsiteX2" fmla="*/ 1747318 w 8528364"/>
+              <a:gd name="connsiteY2" fmla="*/ 651849 h 660903"/>
+              <a:gd name="connsiteX3" fmla="*/ 3395049 w 8528364"/>
+              <a:gd name="connsiteY3" fmla="*/ 651849 h 660903"/>
+              <a:gd name="connsiteX4" fmla="*/ 3395049 w 8528364"/>
+              <a:gd name="connsiteY4" fmla="*/ 0 h 660903"/>
+              <a:gd name="connsiteX5" fmla="*/ 3503691 w 8528364"/>
+              <a:gd name="connsiteY5" fmla="*/ 0 h 660903"/>
+              <a:gd name="connsiteX6" fmla="*/ 3503691 w 8528364"/>
+              <a:gd name="connsiteY6" fmla="*/ 660903 h 660903"/>
+              <a:gd name="connsiteX7" fmla="*/ 5051833 w 8528364"/>
+              <a:gd name="connsiteY7" fmla="*/ 660903 h 660903"/>
+              <a:gd name="connsiteX8" fmla="*/ 5051833 w 8528364"/>
+              <a:gd name="connsiteY8" fmla="*/ 0 h 660903"/>
+              <a:gd name="connsiteX9" fmla="*/ 5115207 w 8528364"/>
+              <a:gd name="connsiteY9" fmla="*/ 0 h 660903"/>
+              <a:gd name="connsiteX10" fmla="*/ 5178582 w 8528364"/>
+              <a:gd name="connsiteY10" fmla="*/ 0 h 660903"/>
+              <a:gd name="connsiteX11" fmla="*/ 5178582 w 8528364"/>
+              <a:gd name="connsiteY11" fmla="*/ 660903 h 660903"/>
+              <a:gd name="connsiteX12" fmla="*/ 6826312 w 8528364"/>
+              <a:gd name="connsiteY12" fmla="*/ 660903 h 660903"/>
+              <a:gd name="connsiteX13" fmla="*/ 6826312 w 8528364"/>
+              <a:gd name="connsiteY13" fmla="*/ 36214 h 660903"/>
+              <a:gd name="connsiteX14" fmla="*/ 8528364 w 8528364"/>
+              <a:gd name="connsiteY14" fmla="*/ 36214 h 660903"/>
+            </a:gdLst>
+            <a:ahLst/>
+            <a:cxnLst>
+              <a:cxn ang="0">
+                <a:pos x="connsiteX0" y="connsiteY0"/>
+              </a:cxn>
+              <a:cxn ang="0">
+                <a:pos x="connsiteX1" y="connsiteY1"/>
+              </a:cxn>
+              <a:cxn ang="0">
+                <a:pos x="connsiteX2" y="connsiteY2"/>
+              </a:cxn>
+              <a:cxn ang="0">
+                <a:pos x="connsiteX3" y="connsiteY3"/>
+              </a:cxn>
+              <a:cxn ang="0">
+                <a:pos x="connsiteX4" y="connsiteY4"/>
+              </a:cxn>
+              <a:cxn ang="0">
+                <a:pos x="connsiteX5" y="connsiteY5"/>
+              </a:cxn>
+              <a:cxn ang="0">
+                <a:pos x="connsiteX6" y="connsiteY6"/>
+              </a:cxn>
+              <a:cxn ang="0">
+                <a:pos x="connsiteX7" y="connsiteY7"/>
+              </a:cxn>
+              <a:cxn ang="0">
+                <a:pos x="connsiteX8" y="connsiteY8"/>
+              </a:cxn>
+              <a:cxn ang="0">
+                <a:pos x="connsiteX9" y="connsiteY9"/>
+              </a:cxn>
+              <a:cxn ang="0">
+                <a:pos x="connsiteX10" y="connsiteY10"/>
+              </a:cxn>
+              <a:cxn ang="0">
+                <a:pos x="connsiteX11" y="connsiteY11"/>
+              </a:cxn>
+              <a:cxn ang="0">
+                <a:pos x="connsiteX12" y="connsiteY12"/>
+              </a:cxn>
+              <a:cxn ang="0">
+                <a:pos x="connsiteX13" y="connsiteY13"/>
+              </a:cxn>
+              <a:cxn ang="0">
+                <a:pos x="connsiteX14" y="connsiteY14"/>
+              </a:cxn>
+            </a:cxnLst>
+            <a:rect l="l" t="t" r="r" b="b"/>
+            <a:pathLst>
+              <a:path w="8528364" h="660903">
+                <a:moveTo>
+                  <a:pt x="0" y="9053"/>
+                </a:moveTo>
+                <a:lnTo>
+                  <a:pt x="1747318" y="9053"/>
+                </a:lnTo>
+                <a:lnTo>
+                  <a:pt x="1747318" y="651849"/>
+                </a:lnTo>
+                <a:lnTo>
+                  <a:pt x="3395049" y="651849"/>
+                </a:lnTo>
+                <a:lnTo>
+                  <a:pt x="3395049" y="0"/>
+                </a:lnTo>
+                <a:lnTo>
+                  <a:pt x="3503691" y="0"/>
+                </a:lnTo>
+                <a:lnTo>
+                  <a:pt x="3503691" y="660903"/>
+                </a:lnTo>
+                <a:lnTo>
+                  <a:pt x="5051833" y="660903"/>
+                </a:lnTo>
+                <a:lnTo>
+                  <a:pt x="5051833" y="0"/>
+                </a:lnTo>
+                <a:lnTo>
+                  <a:pt x="5115207" y="0"/>
+                </a:lnTo>
+                <a:lnTo>
+                  <a:pt x="5178582" y="0"/>
+                </a:lnTo>
+                <a:lnTo>
+                  <a:pt x="5178582" y="660903"/>
+                </a:lnTo>
+                <a:lnTo>
+                  <a:pt x="6826312" y="660903"/>
+                </a:lnTo>
+                <a:lnTo>
+                  <a:pt x="6826312" y="36214"/>
+                </a:lnTo>
+                <a:lnTo>
+                  <a:pt x="8528364" y="36214"/>
+                </a:lnTo>
+              </a:path>
+            </a:pathLst>
+          </a:custGeom>
+          <a:noFill/>
+        </p:spPr>
+        <p:style>
+          <a:lnRef idx="2">
+            <a:schemeClr val="accent1">
+              <a:shade val="50000"/>
+            </a:schemeClr>
+          </a:lnRef>
+          <a:fillRef idx="1">
+            <a:schemeClr val="accent1"/>
+          </a:fillRef>
+          <a:effectRef idx="0">
+            <a:schemeClr val="accent1"/>
+          </a:effectRef>
+          <a:fontRef idx="minor">
+            <a:schemeClr val="lt1"/>
+          </a:fontRef>
+        </p:style>
+        <p:txBody>
+          <a:bodyPr rtlCol="0" anchor="ctr"/>
+          <a:lstStyle/>
+          <a:p>
+            <a:pPr algn="ctr"/>
+            <a:endParaRPr lang="en-GB"/>
+          </a:p>
+        </p:txBody>
+      </p:sp>
+      <p:sp>
+        <p:nvSpPr>
+          <p:cNvPr id="12" name="TextBox 11">
+            <a:extLst>
+              <a:ext uri="{FF2B5EF4-FFF2-40B4-BE49-F238E27FC236}">
+                <a16:creationId xmlns:a16="http://schemas.microsoft.com/office/drawing/2014/main" id="{26EC5298-3D7F-469C-90AE-035B6BE144EF}"/>
+              </a:ext>
+            </a:extLst>
+          </p:cNvPr>
+          <p:cNvSpPr txBox="1"/>
+          <p:nvPr/>
+        </p:nvSpPr>
+        <p:spPr>
+          <a:xfrm>
+            <a:off x="3533917" y="2875405"/>
+            <a:ext cx="301686" cy="369332"/>
+          </a:xfrm>
+          <a:prstGeom prst="rect">
+            <a:avLst/>
+          </a:prstGeom>
+          <a:noFill/>
+        </p:spPr>
+        <p:txBody>
+          <a:bodyPr wrap="none" rtlCol="0">
+            <a:spAutoFit/>
+          </a:bodyPr>
+          <a:lstStyle/>
+          <a:p>
+            <a:r>
+              <a:rPr lang="en-GB" dirty="0"/>
+              <a:t>1</a:t>
+            </a:r>
+          </a:p>
+        </p:txBody>
+      </p:sp>
+      <p:sp>
+        <p:nvSpPr>
+          <p:cNvPr id="13" name="TextBox 12">
+            <a:extLst>
+              <a:ext uri="{FF2B5EF4-FFF2-40B4-BE49-F238E27FC236}">
+                <a16:creationId xmlns:a16="http://schemas.microsoft.com/office/drawing/2014/main" id="{2BC0A5FB-5943-472F-9B26-52D5A0538626}"/>
+              </a:ext>
+            </a:extLst>
+          </p:cNvPr>
+          <p:cNvSpPr txBox="1"/>
+          <p:nvPr/>
+        </p:nvSpPr>
+        <p:spPr>
+          <a:xfrm>
+            <a:off x="5163541" y="2875405"/>
+            <a:ext cx="301686" cy="369332"/>
+          </a:xfrm>
+          <a:prstGeom prst="rect">
+            <a:avLst/>
+          </a:prstGeom>
+          <a:noFill/>
+        </p:spPr>
+        <p:txBody>
+          <a:bodyPr wrap="none" rtlCol="0">
+            <a:spAutoFit/>
+          </a:bodyPr>
+          <a:lstStyle/>
+          <a:p>
+            <a:r>
+              <a:rPr lang="en-GB" dirty="0"/>
+              <a:t>2</a:t>
+            </a:r>
+          </a:p>
+        </p:txBody>
+      </p:sp>
+      <p:sp>
+        <p:nvSpPr>
+          <p:cNvPr id="14" name="TextBox 13">
+            <a:extLst>
+              <a:ext uri="{FF2B5EF4-FFF2-40B4-BE49-F238E27FC236}">
+                <a16:creationId xmlns:a16="http://schemas.microsoft.com/office/drawing/2014/main" id="{08415958-E2BA-49C4-A084-BC4160474E0B}"/>
+              </a:ext>
+            </a:extLst>
+          </p:cNvPr>
+          <p:cNvSpPr txBox="1"/>
+          <p:nvPr/>
+        </p:nvSpPr>
+        <p:spPr>
+          <a:xfrm>
+            <a:off x="5320371" y="2875405"/>
+            <a:ext cx="301686" cy="369332"/>
+          </a:xfrm>
+          <a:prstGeom prst="rect">
+            <a:avLst/>
+          </a:prstGeom>
+          <a:noFill/>
+        </p:spPr>
+        <p:txBody>
+          <a:bodyPr wrap="none" rtlCol="0">
+            <a:spAutoFit/>
+          </a:bodyPr>
+          <a:lstStyle/>
+          <a:p>
+            <a:r>
+              <a:rPr lang="en-GB" dirty="0"/>
+              <a:t>3</a:t>
+            </a:r>
+          </a:p>
+        </p:txBody>
+      </p:sp>
+      <p:sp>
+        <p:nvSpPr>
+          <p:cNvPr id="15" name="TextBox 14">
+            <a:extLst>
+              <a:ext uri="{FF2B5EF4-FFF2-40B4-BE49-F238E27FC236}">
+                <a16:creationId xmlns:a16="http://schemas.microsoft.com/office/drawing/2014/main" id="{F16C49B6-81C1-4FAA-88E4-39C9873B1807}"/>
+              </a:ext>
+            </a:extLst>
+          </p:cNvPr>
+          <p:cNvSpPr txBox="1"/>
+          <p:nvPr/>
+        </p:nvSpPr>
+        <p:spPr>
+          <a:xfrm>
+            <a:off x="6877567" y="2875405"/>
+            <a:ext cx="301686" cy="369332"/>
+          </a:xfrm>
+          <a:prstGeom prst="rect">
+            <a:avLst/>
+          </a:prstGeom>
+          <a:noFill/>
+        </p:spPr>
+        <p:txBody>
+          <a:bodyPr wrap="none" rtlCol="0">
+            <a:spAutoFit/>
+          </a:bodyPr>
+          <a:lstStyle/>
+          <a:p>
+            <a:r>
+              <a:rPr lang="en-GB" dirty="0"/>
+              <a:t>4</a:t>
+            </a:r>
+          </a:p>
+        </p:txBody>
+      </p:sp>
+      <p:sp>
+        <p:nvSpPr>
+          <p:cNvPr id="16" name="TextBox 15">
+            <a:extLst>
+              <a:ext uri="{FF2B5EF4-FFF2-40B4-BE49-F238E27FC236}">
+                <a16:creationId xmlns:a16="http://schemas.microsoft.com/office/drawing/2014/main" id="{60AA2285-59C7-4CCE-800E-D9DE4792F231}"/>
+              </a:ext>
+            </a:extLst>
+          </p:cNvPr>
+          <p:cNvSpPr txBox="1"/>
+          <p:nvPr/>
+        </p:nvSpPr>
+        <p:spPr>
+          <a:xfrm>
+            <a:off x="7028410" y="2875405"/>
+            <a:ext cx="301686" cy="369332"/>
+          </a:xfrm>
+          <a:prstGeom prst="rect">
+            <a:avLst/>
+          </a:prstGeom>
+          <a:noFill/>
+        </p:spPr>
+        <p:txBody>
+          <a:bodyPr wrap="none" rtlCol="0">
+            <a:spAutoFit/>
+          </a:bodyPr>
+          <a:lstStyle/>
+          <a:p>
+            <a:r>
+              <a:rPr lang="en-GB" dirty="0"/>
+              <a:t>5</a:t>
+            </a:r>
+          </a:p>
+        </p:txBody>
+      </p:sp>
+      <p:sp>
+        <p:nvSpPr>
+          <p:cNvPr id="17" name="TextBox 16">
+            <a:extLst>
+              <a:ext uri="{FF2B5EF4-FFF2-40B4-BE49-F238E27FC236}">
+                <a16:creationId xmlns:a16="http://schemas.microsoft.com/office/drawing/2014/main" id="{40D52333-DC64-4465-9260-1E4191AA7B83}"/>
+              </a:ext>
+            </a:extLst>
+          </p:cNvPr>
+          <p:cNvSpPr txBox="1"/>
+          <p:nvPr/>
+        </p:nvSpPr>
+        <p:spPr>
+          <a:xfrm>
+            <a:off x="8594660" y="2875405"/>
+            <a:ext cx="301686" cy="369332"/>
+          </a:xfrm>
+          <a:prstGeom prst="rect">
+            <a:avLst/>
+          </a:prstGeom>
+          <a:noFill/>
+        </p:spPr>
+        <p:txBody>
+          <a:bodyPr wrap="none" rtlCol="0">
+            <a:spAutoFit/>
+          </a:bodyPr>
+          <a:lstStyle/>
+          <a:p>
+            <a:r>
+              <a:rPr lang="en-GB" dirty="0"/>
+              <a:t>6</a:t>
+            </a:r>
+          </a:p>
+        </p:txBody>
+      </p:sp>
+      <p:sp>
+        <p:nvSpPr>
+          <p:cNvPr id="18" name="TextBox 17">
+            <a:extLst>
+              <a:ext uri="{FF2B5EF4-FFF2-40B4-BE49-F238E27FC236}">
+                <a16:creationId xmlns:a16="http://schemas.microsoft.com/office/drawing/2014/main" id="{BE0EC096-DBEB-4893-A503-2AC889C42B90}"/>
+              </a:ext>
+            </a:extLst>
+          </p:cNvPr>
+          <p:cNvSpPr txBox="1"/>
+          <p:nvPr/>
+        </p:nvSpPr>
+        <p:spPr>
+          <a:xfrm>
+            <a:off x="559333" y="1211394"/>
+            <a:ext cx="1396216" cy="646331"/>
+          </a:xfrm>
+          <a:prstGeom prst="rect">
+            <a:avLst/>
+          </a:prstGeom>
+          <a:noFill/>
+        </p:spPr>
+        <p:txBody>
+          <a:bodyPr wrap="none" rtlCol="0">
+            <a:spAutoFit/>
+          </a:bodyPr>
+          <a:lstStyle/>
+          <a:p>
+            <a:r>
+              <a:rPr lang="en-GB" dirty="0"/>
+              <a:t>Second hand</a:t>
+            </a:r>
+          </a:p>
+          <a:p>
+            <a:r>
+              <a:rPr lang="en-GB" dirty="0"/>
+              <a:t>position</a:t>
+            </a:r>
+          </a:p>
+        </p:txBody>
+      </p:sp>
+      <p:sp>
+        <p:nvSpPr>
+          <p:cNvPr id="19" name="TextBox 18">
+            <a:extLst>
+              <a:ext uri="{FF2B5EF4-FFF2-40B4-BE49-F238E27FC236}">
+                <a16:creationId xmlns:a16="http://schemas.microsoft.com/office/drawing/2014/main" id="{F2C93C6D-5D29-4617-BFF0-C41824A10966}"/>
+              </a:ext>
+            </a:extLst>
+          </p:cNvPr>
+          <p:cNvSpPr txBox="1"/>
+          <p:nvPr/>
+        </p:nvSpPr>
+        <p:spPr>
+          <a:xfrm>
+            <a:off x="559333" y="2246189"/>
+            <a:ext cx="1272271" cy="369332"/>
+          </a:xfrm>
+          <a:prstGeom prst="rect">
+            <a:avLst/>
+          </a:prstGeom>
+          <a:noFill/>
+        </p:spPr>
+        <p:txBody>
+          <a:bodyPr wrap="none" rtlCol="0">
+            <a:spAutoFit/>
+          </a:bodyPr>
+          <a:lstStyle/>
+          <a:p>
+            <a:r>
+              <a:rPr lang="en-GB" dirty="0"/>
+              <a:t>Pulse count</a:t>
+            </a:r>
+          </a:p>
+        </p:txBody>
+      </p:sp>
+    </p:spTree>
+    <p:extLst>
+      <p:ext uri="{BB962C8B-B14F-4D97-AF65-F5344CB8AC3E}">
+        <p14:creationId xmlns:p14="http://schemas.microsoft.com/office/powerpoint/2010/main" val="3865725971"/>
       </p:ext>
     </p:extLst>
   </p:cSld>

</xml_diff>